<commit_message>
Improv1. Some further improvements for presentation.pdf needed.
</commit_message>
<xml_diff>
--- a/Presentation/presentation.pptx
+++ b/Presentation/presentation.pptx
@@ -12,7 +12,7 @@
   </p:handoutMasterIdLst>
   <p:sldIdLst>
     <p:sldId id="256" r:id="rId2"/>
-    <p:sldId id="329" r:id="rId3"/>
+    <p:sldId id="355" r:id="rId3"/>
     <p:sldId id="330" r:id="rId4"/>
     <p:sldId id="346" r:id="rId5"/>
     <p:sldId id="347" r:id="rId6"/>
@@ -1190,20 +1190,26 @@
           <a:p>
             <a:pPr algn="ctr"/>
             <a:r>
-              <a:rPr lang="de-DE" altLang="en-US">
+              <a:rPr lang="de-DE" altLang="en-US" dirty="0" smtClean="0">
                 <a:latin typeface="Univers" pitchFamily="34" charset="0"/>
               </a:rPr>
-              <a:t>Speaker</a:t>
-            </a:r>
+              <a:t>Leonard Kleinberger</a:t>
+            </a:r>
+            <a:endParaRPr lang="de-DE" altLang="en-US" dirty="0">
+              <a:latin typeface="Univers" pitchFamily="34" charset="0"/>
+            </a:endParaRPr>
           </a:p>
           <a:p>
             <a:pPr algn="ctr"/>
             <a:r>
-              <a:rPr lang="de-DE" altLang="en-US">
+              <a:rPr lang="de-DE" altLang="en-US" dirty="0" smtClean="0">
                 <a:latin typeface="Univers" pitchFamily="34" charset="0"/>
               </a:rPr>
-              <a:t>(email@of.speaker)</a:t>
-            </a:r>
+              <a:t>(lkleinbe@rhrk.uni-kl.de)</a:t>
+            </a:r>
+            <a:endParaRPr lang="de-DE" altLang="en-US" dirty="0">
+              <a:latin typeface="Univers" pitchFamily="34" charset="0"/>
+            </a:endParaRPr>
           </a:p>
         </p:txBody>
       </p:sp>
@@ -1417,9 +1423,10 @@
           </a:lstStyle>
           <a:p>
             <a:r>
-              <a:rPr lang="de-DE" altLang="en-US"/>
-              <a:t>Speaker – Title (set in slide master, not footer settings)</a:t>
-            </a:r>
+              <a:rPr lang="de-DE" altLang="en-US" dirty="0" smtClean="0"/>
+              <a:t>Leonard Kleinberger – lkleinbe@rhrk.uni-kl.de</a:t>
+            </a:r>
+            <a:endParaRPr lang="de-DE" altLang="en-US" dirty="0"/>
           </a:p>
         </p:txBody>
       </p:sp>
@@ -1476,7 +1483,7 @@
             <a:fld id="{DECB2852-D9F3-4A04-88ED-618224D3766E}" type="datetime1">
               <a:rPr lang="de-DE" altLang="en-US"/>
               <a:pPr/>
-              <a:t>16.06.2023</a:t>
+              <a:t>10.07.2023</a:t>
             </a:fld>
             <a:endParaRPr lang="de-DE" altLang="en-US"/>
           </a:p>
@@ -1618,9 +1625,10 @@
           </a:lstStyle>
           <a:p>
             <a:r>
-              <a:rPr lang="de-DE" altLang="en-US"/>
-              <a:t>Speaker – Title (set in slide master, not footer settings)</a:t>
-            </a:r>
+              <a:rPr lang="de-DE" altLang="en-US" dirty="0" smtClean="0"/>
+              <a:t>Leonard Kleinberger – lkleinbe@rhrk.uni-kl.de</a:t>
+            </a:r>
+            <a:endParaRPr lang="de-DE" altLang="en-US" dirty="0"/>
           </a:p>
         </p:txBody>
       </p:sp>
@@ -1677,7 +1685,7 @@
             <a:fld id="{57A7A2B1-4DA5-4870-9BBE-75E56EC60744}" type="datetime1">
               <a:rPr lang="de-DE" altLang="en-US"/>
               <a:pPr/>
-              <a:t>16.06.2023</a:t>
+              <a:t>10.07.2023</a:t>
             </a:fld>
             <a:endParaRPr lang="de-DE" altLang="en-US"/>
           </a:p>
@@ -1809,9 +1817,10 @@
           </a:lstStyle>
           <a:p>
             <a:r>
-              <a:rPr lang="de-DE" altLang="en-US"/>
-              <a:t>Speaker – Title (set in slide master, not footer settings)</a:t>
-            </a:r>
+              <a:rPr lang="de-DE" altLang="en-US" dirty="0" smtClean="0"/>
+              <a:t>Leonard Kleinberger – lkleinbe@rhrk.uni-kl.de</a:t>
+            </a:r>
+            <a:endParaRPr lang="de-DE" altLang="en-US" dirty="0"/>
           </a:p>
         </p:txBody>
       </p:sp>
@@ -1868,7 +1877,7 @@
             <a:fld id="{3E552DA5-8C0F-49B0-87A3-E6F8095798E9}" type="datetime1">
               <a:rPr lang="de-DE" altLang="en-US"/>
               <a:pPr/>
-              <a:t>16.06.2023</a:t>
+              <a:t>10.07.2023</a:t>
             </a:fld>
             <a:endParaRPr lang="de-DE" altLang="en-US"/>
           </a:p>
@@ -2022,9 +2031,10 @@
           </a:lstStyle>
           <a:p>
             <a:r>
-              <a:rPr lang="de-DE" altLang="en-US"/>
-              <a:t>Speaker – Title (set in slide master, not footer settings)</a:t>
-            </a:r>
+              <a:rPr lang="de-DE" altLang="en-US" dirty="0" smtClean="0"/>
+              <a:t>Leonard Kleinberger – lkleinbe@rhrk.uni-kl.de</a:t>
+            </a:r>
+            <a:endParaRPr lang="de-DE" altLang="en-US" dirty="0"/>
           </a:p>
         </p:txBody>
       </p:sp>
@@ -2081,7 +2091,7 @@
             <a:fld id="{503E9B17-5329-4C0E-BFCB-2DDC3FB94ECE}" type="datetime1">
               <a:rPr lang="de-DE" altLang="en-US"/>
               <a:pPr/>
-              <a:t>16.06.2023</a:t>
+              <a:t>10.07.2023</a:t>
             </a:fld>
             <a:endParaRPr lang="de-DE" altLang="en-US"/>
           </a:p>
@@ -2282,9 +2292,10 @@
           </a:lstStyle>
           <a:p>
             <a:r>
-              <a:rPr lang="de-DE" altLang="en-US"/>
-              <a:t>Speaker – Title (set in slide master, not footer settings)</a:t>
-            </a:r>
+              <a:rPr lang="de-DE" altLang="en-US" dirty="0" smtClean="0"/>
+              <a:t>Leonard Kleinberger – lkleinbe@rhrk.uni-kl.de</a:t>
+            </a:r>
+            <a:endParaRPr lang="de-DE" altLang="en-US" dirty="0"/>
           </a:p>
         </p:txBody>
       </p:sp>
@@ -2341,7 +2352,7 @@
             <a:fld id="{FB3F3C49-46D7-47D9-9B5F-6BC989649C37}" type="datetime1">
               <a:rPr lang="de-DE" altLang="en-US"/>
               <a:pPr/>
-              <a:t>16.06.2023</a:t>
+              <a:t>10.07.2023</a:t>
             </a:fld>
             <a:endParaRPr lang="de-DE" altLang="en-US"/>
           </a:p>
@@ -2677,9 +2688,10 @@
           </a:lstStyle>
           <a:p>
             <a:r>
-              <a:rPr lang="de-DE" altLang="en-US"/>
-              <a:t>Speaker – Title (set in slide master, not footer settings)</a:t>
-            </a:r>
+              <a:rPr lang="de-DE" altLang="en-US" dirty="0" smtClean="0"/>
+              <a:t>Leonard Kleinberger – lkleinbe@rhrk.uni-kl.de</a:t>
+            </a:r>
+            <a:endParaRPr lang="de-DE" altLang="en-US" dirty="0"/>
           </a:p>
         </p:txBody>
       </p:sp>
@@ -2736,7 +2748,7 @@
             <a:fld id="{21D80FCA-1B4D-4108-961B-50098F815E59}" type="datetime1">
               <a:rPr lang="de-DE" altLang="en-US"/>
               <a:pPr/>
-              <a:t>16.06.2023</a:t>
+              <a:t>10.07.2023</a:t>
             </a:fld>
             <a:endParaRPr lang="de-DE" altLang="en-US"/>
           </a:p>
@@ -2823,9 +2835,10 @@
           </a:lstStyle>
           <a:p>
             <a:r>
-              <a:rPr lang="de-DE" altLang="en-US"/>
-              <a:t>Speaker – Title (set in slide master, not footer settings)</a:t>
-            </a:r>
+              <a:rPr lang="de-DE" altLang="en-US" dirty="0" smtClean="0"/>
+              <a:t>Leonard Kleinberger – lkleinbe@rhrk.uni-kl.de</a:t>
+            </a:r>
+            <a:endParaRPr lang="de-DE" altLang="en-US" dirty="0"/>
           </a:p>
         </p:txBody>
       </p:sp>
@@ -2882,7 +2895,7 @@
             <a:fld id="{AFA792F1-C703-4CFE-8132-5D624ACE68CE}" type="datetime1">
               <a:rPr lang="de-DE" altLang="en-US"/>
               <a:pPr/>
-              <a:t>16.06.2023</a:t>
+              <a:t>10.07.2023</a:t>
             </a:fld>
             <a:endParaRPr lang="de-DE" altLang="en-US"/>
           </a:p>
@@ -2946,9 +2959,10 @@
           </a:lstStyle>
           <a:p>
             <a:r>
-              <a:rPr lang="de-DE" altLang="en-US"/>
-              <a:t>Speaker – Title (set in slide master, not footer settings)</a:t>
-            </a:r>
+              <a:rPr lang="de-DE" altLang="en-US" dirty="0" smtClean="0"/>
+              <a:t>Leonard Kleinberger – lkleinbe@rhrk.uni-kl.de</a:t>
+            </a:r>
+            <a:endParaRPr lang="de-DE" altLang="en-US" dirty="0"/>
           </a:p>
         </p:txBody>
       </p:sp>
@@ -3005,7 +3019,7 @@
             <a:fld id="{1D6B3DFA-A095-496A-B161-C25C25BB0283}" type="datetime1">
               <a:rPr lang="de-DE" altLang="en-US"/>
               <a:pPr/>
-              <a:t>16.06.2023</a:t>
+              <a:t>10.07.2023</a:t>
             </a:fld>
             <a:endParaRPr lang="de-DE" altLang="en-US"/>
           </a:p>
@@ -3244,9 +3258,10 @@
           </a:lstStyle>
           <a:p>
             <a:r>
-              <a:rPr lang="de-DE" altLang="en-US"/>
-              <a:t>Speaker – Title (set in slide master, not footer settings)</a:t>
-            </a:r>
+              <a:rPr lang="de-DE" altLang="en-US" dirty="0" smtClean="0"/>
+              <a:t>Leonard Kleinberger – lkleinbe@rhrk.uni-kl.de</a:t>
+            </a:r>
+            <a:endParaRPr lang="de-DE" altLang="en-US" dirty="0"/>
           </a:p>
         </p:txBody>
       </p:sp>
@@ -3303,7 +3318,7 @@
             <a:fld id="{F51F7DB3-8C41-4933-A6D0-63E4AF3636C9}" type="datetime1">
               <a:rPr lang="de-DE" altLang="en-US"/>
               <a:pPr/>
-              <a:t>16.06.2023</a:t>
+              <a:t>10.07.2023</a:t>
             </a:fld>
             <a:endParaRPr lang="de-DE" altLang="en-US"/>
           </a:p>
@@ -3518,9 +3533,10 @@
           </a:lstStyle>
           <a:p>
             <a:r>
-              <a:rPr lang="de-DE" altLang="en-US"/>
-              <a:t>Speaker – Title (set in slide master, not footer settings)</a:t>
-            </a:r>
+              <a:rPr lang="de-DE" altLang="en-US" dirty="0" smtClean="0"/>
+              <a:t>Leonard Kleinberger – lkleinbe@rhrk.uni-kl.de</a:t>
+            </a:r>
+            <a:endParaRPr lang="de-DE" altLang="en-US" dirty="0"/>
           </a:p>
         </p:txBody>
       </p:sp>
@@ -3577,7 +3593,7 @@
             <a:fld id="{F14560C8-9D99-4DD4-AE63-3F6F409CBE48}" type="datetime1">
               <a:rPr lang="de-DE" altLang="en-US"/>
               <a:pPr/>
-              <a:t>16.06.2023</a:t>
+              <a:t>10.07.2023</a:t>
             </a:fld>
             <a:endParaRPr lang="de-DE" altLang="en-US"/>
           </a:p>
@@ -3899,9 +3915,10 @@
           </a:lstStyle>
           <a:p>
             <a:r>
-              <a:rPr lang="de-DE" altLang="en-US"/>
-              <a:t>Speaker – Title (set in slide master, not footer settings)</a:t>
-            </a:r>
+              <a:rPr lang="de-DE" altLang="en-US" dirty="0" smtClean="0"/>
+              <a:t>Leonard Kleinberger – lkleinbe@rhrk.uni-kl.de</a:t>
+            </a:r>
+            <a:endParaRPr lang="de-DE" altLang="en-US" dirty="0"/>
           </a:p>
         </p:txBody>
       </p:sp>
@@ -4103,7 +4120,7 @@
             <a:fld id="{D8322974-A432-4766-B458-D65701FF4B39}" type="datetime1">
               <a:rPr lang="de-DE" altLang="en-US"/>
               <a:pPr/>
-              <a:t>16.06.2023</a:t>
+              <a:t>10.07.2023</a:t>
             </a:fld>
             <a:endParaRPr lang="de-DE" altLang="en-US"/>
           </a:p>
@@ -4740,50 +4757,9 @@
           <a:lstStyle/>
           <a:p>
             <a:r>
-              <a:rPr lang="de-DE" altLang="en-US" dirty="0" smtClean="0"/>
-              <a:t>Speaker – Title (</a:t>
-            </a:r>
-            <a:r>
-              <a:rPr lang="de-DE" altLang="en-US" dirty="0" err="1" smtClean="0"/>
-              <a:t>set</a:t>
-            </a:r>
-            <a:r>
-              <a:rPr lang="de-DE" altLang="en-US" dirty="0" smtClean="0"/>
-              <a:t> in </a:t>
-            </a:r>
-            <a:r>
-              <a:rPr lang="de-DE" altLang="en-US" dirty="0" err="1" smtClean="0"/>
-              <a:t>slide</a:t>
-            </a:r>
-            <a:r>
-              <a:rPr lang="de-DE" altLang="en-US" dirty="0" smtClean="0"/>
-              <a:t> </a:t>
-            </a:r>
-            <a:r>
-              <a:rPr lang="de-DE" altLang="en-US" dirty="0" err="1" smtClean="0"/>
-              <a:t>master</a:t>
-            </a:r>
-            <a:r>
-              <a:rPr lang="de-DE" altLang="en-US" dirty="0" smtClean="0"/>
-              <a:t>, not </a:t>
-            </a:r>
-            <a:r>
-              <a:rPr lang="de-DE" altLang="en-US" dirty="0" err="1" smtClean="0"/>
-              <a:t>footer</a:t>
-            </a:r>
-            <a:r>
-              <a:rPr lang="de-DE" altLang="en-US" dirty="0" smtClean="0"/>
-              <a:t> </a:t>
-            </a:r>
-            <a:r>
-              <a:rPr lang="de-DE" altLang="en-US" dirty="0" err="1" smtClean="0"/>
-              <a:t>settings</a:t>
-            </a:r>
-            <a:r>
-              <a:rPr lang="de-DE" altLang="en-US" dirty="0" smtClean="0"/>
-              <a:t>)</a:t>
-            </a:r>
-            <a:endParaRPr lang="de-DE" altLang="en-US" dirty="0"/>
+              <a:rPr lang="de-DE" altLang="en-US" dirty="0"/>
+              <a:t>Leonard Kleinberger – lkleinbe@rhrk.uni-kl.de</a:t>
+            </a:r>
           </a:p>
         </p:txBody>
       </p:sp>
@@ -5056,50 +5032,9 @@
           <a:lstStyle/>
           <a:p>
             <a:r>
-              <a:rPr lang="de-DE" altLang="en-US" dirty="0" smtClean="0"/>
-              <a:t>Speaker – Title (</a:t>
-            </a:r>
-            <a:r>
-              <a:rPr lang="de-DE" altLang="en-US" dirty="0" err="1" smtClean="0"/>
-              <a:t>set</a:t>
-            </a:r>
-            <a:r>
-              <a:rPr lang="de-DE" altLang="en-US" dirty="0" smtClean="0"/>
-              <a:t> in </a:t>
-            </a:r>
-            <a:r>
-              <a:rPr lang="de-DE" altLang="en-US" dirty="0" err="1" smtClean="0"/>
-              <a:t>slide</a:t>
-            </a:r>
-            <a:r>
-              <a:rPr lang="de-DE" altLang="en-US" dirty="0" smtClean="0"/>
-              <a:t> </a:t>
-            </a:r>
-            <a:r>
-              <a:rPr lang="de-DE" altLang="en-US" dirty="0" err="1" smtClean="0"/>
-              <a:t>master</a:t>
-            </a:r>
-            <a:r>
-              <a:rPr lang="de-DE" altLang="en-US" dirty="0" smtClean="0"/>
-              <a:t>, not </a:t>
-            </a:r>
-            <a:r>
-              <a:rPr lang="de-DE" altLang="en-US" dirty="0" err="1" smtClean="0"/>
-              <a:t>footer</a:t>
-            </a:r>
-            <a:r>
-              <a:rPr lang="de-DE" altLang="en-US" dirty="0" smtClean="0"/>
-              <a:t> </a:t>
-            </a:r>
-            <a:r>
-              <a:rPr lang="de-DE" altLang="en-US" dirty="0" err="1" smtClean="0"/>
-              <a:t>settings</a:t>
-            </a:r>
-            <a:r>
-              <a:rPr lang="de-DE" altLang="en-US" dirty="0" smtClean="0"/>
-              <a:t>)</a:t>
-            </a:r>
-            <a:endParaRPr lang="de-DE" altLang="en-US" dirty="0"/>
+              <a:rPr lang="de-DE" altLang="en-US" dirty="0"/>
+              <a:t>Leonard Kleinberger – lkleinbe@rhrk.uni-kl.de</a:t>
+            </a:r>
           </a:p>
         </p:txBody>
       </p:sp>
@@ -5380,8 +5315,8 @@
           </a:p>
         </p:txBody>
       </p:sp>
-      <mc:AlternateContent xmlns:mc="http://schemas.openxmlformats.org/markup-compatibility/2006">
-        <mc:Choice xmlns:a14="http://schemas.microsoft.com/office/drawing/2010/main" Requires="a14">
+      <mc:AlternateContent xmlns:mc="http://schemas.openxmlformats.org/markup-compatibility/2006" xmlns:a14="http://schemas.microsoft.com/office/drawing/2010/main">
+        <mc:Choice Requires="a14">
           <p:sp>
             <p:nvSpPr>
               <p:cNvPr id="8" name="Textfeld 7"/>
@@ -5657,7 +5592,7 @@
             </p:txBody>
           </p:sp>
         </mc:Choice>
-        <mc:Fallback>
+        <mc:Fallback xmlns="">
           <p:sp>
             <p:nvSpPr>
               <p:cNvPr id="8" name="Textfeld 7"/>
@@ -5764,8 +5699,8 @@
           </a:p>
         </p:txBody>
       </p:sp>
-      <mc:AlternateContent xmlns:mc="http://schemas.openxmlformats.org/markup-compatibility/2006">
-        <mc:Choice xmlns:a14="http://schemas.microsoft.com/office/drawing/2010/main" Requires="a14">
+      <mc:AlternateContent xmlns:mc="http://schemas.openxmlformats.org/markup-compatibility/2006" xmlns:a14="http://schemas.microsoft.com/office/drawing/2010/main">
+        <mc:Choice Requires="a14">
           <p:sp>
             <p:nvSpPr>
               <p:cNvPr id="8" name="Inhaltsplatzhalter 7"/>
@@ -5871,7 +5806,7 @@
             </p:txBody>
           </p:sp>
         </mc:Choice>
-        <mc:Fallback>
+        <mc:Fallback xmlns="">
           <p:sp>
             <p:nvSpPr>
               <p:cNvPr id="8" name="Inhaltsplatzhalter 7"/>
@@ -5905,8 +5840,8 @@
           </p:sp>
         </mc:Fallback>
       </mc:AlternateContent>
-      <mc:AlternateContent xmlns:mc="http://schemas.openxmlformats.org/markup-compatibility/2006">
-        <mc:Choice xmlns:a14="http://schemas.microsoft.com/office/drawing/2010/main" Requires="a14">
+      <mc:AlternateContent xmlns:mc="http://schemas.openxmlformats.org/markup-compatibility/2006" xmlns:a14="http://schemas.microsoft.com/office/drawing/2010/main">
+        <mc:Choice Requires="a14">
           <p:sp>
             <p:nvSpPr>
               <p:cNvPr id="9" name="Inhaltsplatzhalter 8"/>
@@ -6076,7 +6011,7 @@
             </p:txBody>
           </p:sp>
         </mc:Choice>
-        <mc:Fallback>
+        <mc:Fallback xmlns="">
           <p:sp>
             <p:nvSpPr>
               <p:cNvPr id="9" name="Inhaltsplatzhalter 8"/>
@@ -6130,10 +6065,9 @@
           <a:lstStyle/>
           <a:p>
             <a:r>
-              <a:rPr lang="de-DE" altLang="en-US" smtClean="0"/>
-              <a:t>Speaker – Title (set in slide master, not footer settings)</a:t>
-            </a:r>
-            <a:endParaRPr lang="de-DE" altLang="en-US"/>
+              <a:rPr lang="de-DE" altLang="en-US" dirty="0"/>
+              <a:t>Leonard Kleinberger – lkleinbe@rhrk.uni-kl.de</a:t>
+            </a:r>
           </a:p>
         </p:txBody>
       </p:sp>
@@ -6230,8 +6164,8 @@
           </a:p>
         </p:txBody>
       </p:sp>
-      <mc:AlternateContent xmlns:mc="http://schemas.openxmlformats.org/markup-compatibility/2006">
-        <mc:Choice xmlns:a14="http://schemas.microsoft.com/office/drawing/2010/main" Requires="a14">
+      <mc:AlternateContent xmlns:mc="http://schemas.openxmlformats.org/markup-compatibility/2006" xmlns:a14="http://schemas.microsoft.com/office/drawing/2010/main">
+        <mc:Choice Requires="a14">
           <p:sp>
             <p:nvSpPr>
               <p:cNvPr id="8" name="Inhaltsplatzhalter 7"/>
@@ -6343,7 +6277,7 @@
             </p:txBody>
           </p:sp>
         </mc:Choice>
-        <mc:Fallback>
+        <mc:Fallback xmlns="">
           <p:sp>
             <p:nvSpPr>
               <p:cNvPr id="8" name="Inhaltsplatzhalter 7"/>
@@ -6377,8 +6311,8 @@
           </p:sp>
         </mc:Fallback>
       </mc:AlternateContent>
-      <mc:AlternateContent xmlns:mc="http://schemas.openxmlformats.org/markup-compatibility/2006">
-        <mc:Choice xmlns:a14="http://schemas.microsoft.com/office/drawing/2010/main" Requires="a14">
+      <mc:AlternateContent xmlns:mc="http://schemas.openxmlformats.org/markup-compatibility/2006" xmlns:a14="http://schemas.microsoft.com/office/drawing/2010/main">
+        <mc:Choice Requires="a14">
           <p:sp>
             <p:nvSpPr>
               <p:cNvPr id="9" name="Inhaltsplatzhalter 8"/>
@@ -6622,7 +6556,7 @@
             </p:txBody>
           </p:sp>
         </mc:Choice>
-        <mc:Fallback>
+        <mc:Fallback xmlns="">
           <p:sp>
             <p:nvSpPr>
               <p:cNvPr id="9" name="Inhaltsplatzhalter 8"/>
@@ -6676,10 +6610,9 @@
           <a:lstStyle/>
           <a:p>
             <a:r>
-              <a:rPr lang="de-DE" altLang="en-US" smtClean="0"/>
-              <a:t>Speaker – Title (set in slide master, not footer settings)</a:t>
-            </a:r>
-            <a:endParaRPr lang="de-DE" altLang="en-US"/>
+              <a:rPr lang="de-DE" altLang="en-US" dirty="0"/>
+              <a:t>Leonard Kleinberger – lkleinbe@rhrk.uni-kl.de</a:t>
+            </a:r>
           </a:p>
         </p:txBody>
       </p:sp>
@@ -6776,8 +6709,8 @@
           </a:p>
         </p:txBody>
       </p:sp>
-      <mc:AlternateContent xmlns:mc="http://schemas.openxmlformats.org/markup-compatibility/2006">
-        <mc:Choice xmlns:a14="http://schemas.microsoft.com/office/drawing/2010/main" Requires="a14">
+      <mc:AlternateContent xmlns:mc="http://schemas.openxmlformats.org/markup-compatibility/2006" xmlns:a14="http://schemas.microsoft.com/office/drawing/2010/main">
+        <mc:Choice Requires="a14">
           <p:sp>
             <p:nvSpPr>
               <p:cNvPr id="6" name="Inhaltsplatzhalter 5"/>
@@ -7124,7 +7057,7 @@
             </p:txBody>
           </p:sp>
         </mc:Choice>
-        <mc:Fallback>
+        <mc:Fallback xmlns="">
           <p:sp>
             <p:nvSpPr>
               <p:cNvPr id="6" name="Inhaltsplatzhalter 5"/>
@@ -7306,10 +7239,9 @@
           <a:lstStyle/>
           <a:p>
             <a:r>
-              <a:rPr lang="de-DE" altLang="en-US" smtClean="0"/>
-              <a:t>Speaker – Title (set in slide master, not footer settings)</a:t>
-            </a:r>
-            <a:endParaRPr lang="de-DE" altLang="en-US"/>
+              <a:rPr lang="de-DE" altLang="en-US" dirty="0"/>
+              <a:t>Leonard Kleinberger – lkleinbe@rhrk.uni-kl.de</a:t>
+            </a:r>
           </a:p>
         </p:txBody>
       </p:sp>
@@ -7518,10 +7450,9 @@
           <a:lstStyle/>
           <a:p>
             <a:r>
-              <a:rPr lang="de-DE" altLang="en-US" smtClean="0"/>
-              <a:t>Speaker – Title (set in slide master, not footer settings)</a:t>
-            </a:r>
-            <a:endParaRPr lang="de-DE" altLang="en-US"/>
+              <a:rPr lang="de-DE" altLang="en-US" dirty="0"/>
+              <a:t>Leonard Kleinberger – lkleinbe@rhrk.uni-kl.de</a:t>
+            </a:r>
           </a:p>
         </p:txBody>
       </p:sp>
@@ -7678,10 +7609,9 @@
           <a:lstStyle/>
           <a:p>
             <a:r>
-              <a:rPr lang="de-DE" altLang="en-US" smtClean="0"/>
-              <a:t>Speaker – Title (set in slide master, not footer settings)</a:t>
-            </a:r>
-            <a:endParaRPr lang="de-DE" altLang="en-US"/>
+              <a:rPr lang="de-DE" altLang="en-US" dirty="0"/>
+              <a:t>Leonard Kleinberger – lkleinbe@rhrk.uni-kl.de</a:t>
+            </a:r>
           </a:p>
         </p:txBody>
       </p:sp>
@@ -7737,6 +7667,95 @@
           </a:prstGeom>
         </p:spPr>
       </p:pic>
+      <p:sp>
+        <p:nvSpPr>
+          <p:cNvPr id="7" name="Rechteck 6"/>
+          <p:cNvSpPr/>
+          <p:nvPr/>
+        </p:nvSpPr>
+        <p:spPr>
+          <a:xfrm>
+            <a:off x="359415" y="2276840"/>
+            <a:ext cx="8425170" cy="4032560"/>
+          </a:xfrm>
+          <a:prstGeom prst="rect">
+            <a:avLst/>
+          </a:prstGeom>
+          <a:noFill/>
+          <a:ln w="76200">
+            <a:solidFill>
+              <a:srgbClr val="C00000"/>
+            </a:solidFill>
+          </a:ln>
+        </p:spPr>
+        <p:style>
+          <a:lnRef idx="2">
+            <a:schemeClr val="accent1">
+              <a:shade val="50000"/>
+            </a:schemeClr>
+          </a:lnRef>
+          <a:fillRef idx="1">
+            <a:schemeClr val="accent1"/>
+          </a:fillRef>
+          <a:effectRef idx="0">
+            <a:schemeClr val="accent1"/>
+          </a:effectRef>
+          <a:fontRef idx="minor">
+            <a:schemeClr val="lt1"/>
+          </a:fontRef>
+        </p:style>
+        <p:txBody>
+          <a:bodyPr rtlCol="0" anchor="ctr"/>
+          <a:lstStyle/>
+          <a:p>
+            <a:pPr algn="ctr"/>
+            <a:r>
+              <a:rPr lang="de-DE" dirty="0" smtClean="0">
+                <a:solidFill>
+                  <a:srgbClr val="FF0000"/>
+                </a:solidFill>
+              </a:rPr>
+              <a:t>FIXME:</a:t>
+            </a:r>
+            <a:br>
+              <a:rPr lang="de-DE" dirty="0" smtClean="0">
+                <a:solidFill>
+                  <a:srgbClr val="FF0000"/>
+                </a:solidFill>
+              </a:rPr>
+            </a:br>
+            <a:r>
+              <a:rPr lang="de-DE" dirty="0" err="1" smtClean="0">
+                <a:solidFill>
+                  <a:srgbClr val="FF0000"/>
+                </a:solidFill>
+              </a:rPr>
+              <a:t>improve</a:t>
+            </a:r>
+            <a:r>
+              <a:rPr lang="de-DE" dirty="0" smtClean="0">
+                <a:solidFill>
+                  <a:srgbClr val="FF0000"/>
+                </a:solidFill>
+              </a:rPr>
+              <a:t> </a:t>
+            </a:r>
+            <a:r>
+              <a:rPr lang="de-DE" dirty="0" err="1" smtClean="0">
+                <a:solidFill>
+                  <a:srgbClr val="FF0000"/>
+                </a:solidFill>
+              </a:rPr>
+              <a:t>vis</a:t>
+            </a:r>
+            <a:endParaRPr lang="de-DE" dirty="0">
+              <a:solidFill>
+                <a:srgbClr val="FF0000"/>
+              </a:solidFill>
+            </a:endParaRPr>
+          </a:p>
+        </p:txBody>
+      </p:sp>
     </p:spTree>
     <p:extLst>
       <p:ext uri="{BB962C8B-B14F-4D97-AF65-F5344CB8AC3E}">
@@ -7814,10 +7833,9 @@
           <a:lstStyle/>
           <a:p>
             <a:r>
-              <a:rPr lang="de-DE" altLang="en-US" smtClean="0"/>
-              <a:t>Speaker – Title (set in slide master, not footer settings)</a:t>
-            </a:r>
-            <a:endParaRPr lang="de-DE" altLang="en-US"/>
+              <a:rPr lang="de-DE" altLang="en-US" dirty="0"/>
+              <a:t>Leonard Kleinberger – lkleinbe@rhrk.uni-kl.de</a:t>
+            </a:r>
           </a:p>
         </p:txBody>
       </p:sp>
@@ -7879,6 +7897,79 @@
           </a:prstGeom>
         </p:spPr>
       </p:pic>
+      <p:sp>
+        <p:nvSpPr>
+          <p:cNvPr id="3" name="Rechteck 2"/>
+          <p:cNvSpPr/>
+          <p:nvPr/>
+        </p:nvSpPr>
+        <p:spPr>
+          <a:xfrm>
+            <a:off x="189071" y="1052670"/>
+            <a:ext cx="8425170" cy="4320600"/>
+          </a:xfrm>
+          <a:prstGeom prst="rect">
+            <a:avLst/>
+          </a:prstGeom>
+          <a:noFill/>
+          <a:ln w="76200">
+            <a:solidFill>
+              <a:srgbClr val="C00000"/>
+            </a:solidFill>
+          </a:ln>
+        </p:spPr>
+        <p:style>
+          <a:lnRef idx="2">
+            <a:schemeClr val="accent1">
+              <a:shade val="50000"/>
+            </a:schemeClr>
+          </a:lnRef>
+          <a:fillRef idx="1">
+            <a:schemeClr val="accent1"/>
+          </a:fillRef>
+          <a:effectRef idx="0">
+            <a:schemeClr val="accent1"/>
+          </a:effectRef>
+          <a:fontRef idx="minor">
+            <a:schemeClr val="lt1"/>
+          </a:fontRef>
+        </p:style>
+        <p:txBody>
+          <a:bodyPr rtlCol="0" anchor="ctr"/>
+          <a:lstStyle/>
+          <a:p>
+            <a:pPr algn="ctr"/>
+            <a:r>
+              <a:rPr lang="de-DE" dirty="0" smtClean="0">
+                <a:solidFill>
+                  <a:srgbClr val="FF0000"/>
+                </a:solidFill>
+              </a:rPr>
+              <a:t>FIXME:</a:t>
+            </a:r>
+            <a:br>
+              <a:rPr lang="de-DE" dirty="0" smtClean="0">
+                <a:solidFill>
+                  <a:srgbClr val="FF0000"/>
+                </a:solidFill>
+              </a:rPr>
+            </a:br>
+            <a:r>
+              <a:rPr lang="de-DE" dirty="0" smtClean="0">
+                <a:solidFill>
+                  <a:srgbClr val="FF0000"/>
+                </a:solidFill>
+              </a:rPr>
+              <a:t>REMOVE NO ACB ON NEXT SLIDE</a:t>
+            </a:r>
+            <a:endParaRPr lang="de-DE" dirty="0">
+              <a:solidFill>
+                <a:srgbClr val="FF0000"/>
+              </a:solidFill>
+            </a:endParaRPr>
+          </a:p>
+        </p:txBody>
+      </p:sp>
     </p:spTree>
     <p:extLst>
       <p:ext uri="{BB962C8B-B14F-4D97-AF65-F5344CB8AC3E}">
@@ -7960,10 +8051,9 @@
           <a:lstStyle/>
           <a:p>
             <a:r>
-              <a:rPr lang="de-DE" altLang="en-US" smtClean="0"/>
-              <a:t>Speaker – Title (set in slide master, not footer settings)</a:t>
-            </a:r>
-            <a:endParaRPr lang="de-DE" altLang="en-US"/>
+              <a:rPr lang="de-DE" altLang="en-US" dirty="0"/>
+              <a:t>Leonard Kleinberger – lkleinbe@rhrk.uni-kl.de</a:t>
+            </a:r>
           </a:p>
         </p:txBody>
       </p:sp>
@@ -8017,8 +8107,8 @@
         </p:blipFill>
         <p:spPr>
           <a:xfrm>
-            <a:off x="-972770" y="620610"/>
-            <a:ext cx="10441450" cy="5707093"/>
+            <a:off x="0" y="841773"/>
+            <a:ext cx="8964610" cy="4899881"/>
           </a:xfrm>
           <a:prstGeom prst="rect">
             <a:avLst/>
@@ -8065,12 +8155,12 @@
       </p:grpSpPr>
       <p:sp>
         <p:nvSpPr>
-          <p:cNvPr id="4" name="Footer Placeholder 3"/>
+          <p:cNvPr id="6" name="Titel 5"/>
           <p:cNvSpPr>
             <a:spLocks noGrp="1"/>
           </p:cNvSpPr>
           <p:nvPr>
-            <p:ph type="ftr" sz="quarter" idx="10"/>
+            <p:ph type="title"/>
           </p:nvPr>
         </p:nvSpPr>
         <p:spPr/>
@@ -8079,78 +8169,21 @@
           <a:lstStyle/>
           <a:p>
             <a:r>
-              <a:rPr lang="de-DE" altLang="en-US" dirty="0"/>
-              <a:t>Speaker – Title (</a:t>
-            </a:r>
-            <a:r>
-              <a:rPr lang="de-DE" altLang="en-US" dirty="0" err="1"/>
-              <a:t>set</a:t>
-            </a:r>
-            <a:r>
-              <a:rPr lang="de-DE" altLang="en-US"/>
-              <a:t> in slide master, not footer settings)</a:t>
-            </a:r>
-          </a:p>
-        </p:txBody>
-      </p:sp>
-      <p:sp>
-        <p:nvSpPr>
-          <p:cNvPr id="5" name="Slide Number Placeholder 4"/>
+              <a:rPr lang="en-US" altLang="en-US" dirty="0"/>
+              <a:t>Table of Contents</a:t>
+            </a:r>
+            <a:endParaRPr lang="de-DE" dirty="0"/>
+          </a:p>
+        </p:txBody>
+      </p:sp>
+      <p:sp>
+        <p:nvSpPr>
+          <p:cNvPr id="7" name="Inhaltsplatzhalter 6"/>
           <p:cNvSpPr>
             <a:spLocks noGrp="1"/>
           </p:cNvSpPr>
           <p:nvPr>
-            <p:ph type="sldNum" sz="quarter" idx="11"/>
-          </p:nvPr>
-        </p:nvSpPr>
-        <p:spPr/>
-        <p:txBody>
-          <a:bodyPr/>
-          <a:lstStyle/>
-          <a:p>
-            <a:fld id="{7194B77C-3752-430E-9898-D6F1EF3E7220}" type="slidenum">
-              <a:rPr lang="de-DE" altLang="en-US"/>
-              <a:pPr/>
-              <a:t>2</a:t>
-            </a:fld>
-            <a:r>
-              <a:rPr lang="de-DE" altLang="en-US"/>
-              <a:t>/XX</a:t>
-            </a:r>
-          </a:p>
-        </p:txBody>
-      </p:sp>
-      <p:sp>
-        <p:nvSpPr>
-          <p:cNvPr id="1327106" name="Rectangle 2"/>
-          <p:cNvSpPr>
-            <a:spLocks noGrp="1" noChangeArrowheads="1"/>
-          </p:cNvSpPr>
-          <p:nvPr>
-            <p:ph type="title"/>
-          </p:nvPr>
-        </p:nvSpPr>
-        <p:spPr/>
-        <p:txBody>
-          <a:bodyPr/>
-          <a:lstStyle/>
-          <a:p>
-            <a:r>
-              <a:rPr lang="en-US" altLang="en-US" dirty="0" smtClean="0"/>
-              <a:t>Table of Contents</a:t>
-            </a:r>
-            <a:endParaRPr lang="en-US" altLang="en-US" dirty="0"/>
-          </a:p>
-        </p:txBody>
-      </p:sp>
-      <p:sp>
-        <p:nvSpPr>
-          <p:cNvPr id="1327107" name="Rectangle 3"/>
-          <p:cNvSpPr>
-            <a:spLocks noGrp="1" noChangeArrowheads="1"/>
-          </p:cNvSpPr>
-          <p:nvPr>
-            <p:ph type="body" idx="1"/>
+            <p:ph idx="1"/>
           </p:nvPr>
         </p:nvSpPr>
         <p:spPr/>
@@ -8164,7 +8197,7 @@
               <a:buAutoNum type="arabicPeriod"/>
             </a:pPr>
             <a:r>
-              <a:rPr lang="de-DE" altLang="en-US" noProof="1" smtClean="0"/>
+              <a:rPr lang="de-DE" altLang="en-US" noProof="1"/>
               <a:t>LTE Networks</a:t>
             </a:r>
           </a:p>
@@ -8174,7 +8207,7 @@
               <a:buFont typeface="Wingdings" panose="05000000000000000000" pitchFamily="2" charset="2"/>
               <a:buAutoNum type="arabicPeriod"/>
             </a:pPr>
-            <a:endParaRPr lang="de-DE" altLang="en-US" noProof="1" smtClean="0">
+            <a:endParaRPr lang="de-DE" altLang="en-US" noProof="1">
               <a:solidFill>
                 <a:schemeClr val="bg2"/>
               </a:solidFill>
@@ -8187,7 +8220,7 @@
               <a:buAutoNum type="arabicPeriod"/>
             </a:pPr>
             <a:r>
-              <a:rPr lang="de-DE" altLang="en-US" noProof="1" smtClean="0"/>
+              <a:rPr lang="de-DE" altLang="en-US" noProof="1"/>
               <a:t>RACH as Bottleneck</a:t>
             </a:r>
           </a:p>
@@ -8197,7 +8230,7 @@
               <a:buFont typeface="Wingdings" panose="05000000000000000000" pitchFamily="2" charset="2"/>
               <a:buAutoNum type="arabicPeriod"/>
             </a:pPr>
-            <a:endParaRPr lang="de-DE" altLang="en-US" noProof="1" smtClean="0">
+            <a:endParaRPr lang="de-DE" altLang="en-US" noProof="1">
               <a:solidFill>
                 <a:schemeClr val="bg2"/>
               </a:solidFill>
@@ -8210,7 +8243,7 @@
               <a:buAutoNum type="arabicPeriod"/>
             </a:pPr>
             <a:r>
-              <a:rPr lang="de-DE" altLang="en-US" noProof="1" smtClean="0"/>
+              <a:rPr lang="de-DE" altLang="en-US" noProof="1"/>
               <a:t>RACH Procedure in Detail</a:t>
             </a:r>
           </a:p>
@@ -8229,7 +8262,7 @@
               <a:buAutoNum type="arabicPeriod"/>
             </a:pPr>
             <a:r>
-              <a:rPr lang="de-DE" altLang="en-US" noProof="1" smtClean="0"/>
+              <a:rPr lang="de-DE" altLang="en-US" noProof="1"/>
               <a:t>Access Class Barring</a:t>
             </a:r>
           </a:p>
@@ -8248,7 +8281,7 @@
               <a:buAutoNum type="arabicPeriod"/>
             </a:pPr>
             <a:r>
-              <a:rPr lang="de-DE" altLang="en-US" noProof="1" smtClean="0"/>
+              <a:rPr lang="de-DE" altLang="en-US" noProof="1"/>
               <a:t>Analysis</a:t>
             </a:r>
           </a:p>
@@ -8267,26 +8300,77 @@
               <a:buAutoNum type="arabicPeriod"/>
             </a:pPr>
             <a:r>
-              <a:rPr lang="de-DE" altLang="en-US" noProof="1" smtClean="0"/>
+              <a:rPr lang="de-DE" altLang="en-US" noProof="1"/>
               <a:t>Simulation</a:t>
             </a:r>
-            <a:endParaRPr lang="de-DE" altLang="en-US" noProof="1"/>
+          </a:p>
+          <a:p>
+            <a:endParaRPr lang="de-DE" dirty="0"/>
+          </a:p>
+        </p:txBody>
+      </p:sp>
+      <p:sp>
+        <p:nvSpPr>
+          <p:cNvPr id="4" name="Fußzeilenplatzhalter 3"/>
+          <p:cNvSpPr>
+            <a:spLocks noGrp="1"/>
+          </p:cNvSpPr>
+          <p:nvPr>
+            <p:ph type="ftr" sz="quarter" idx="10"/>
+          </p:nvPr>
+        </p:nvSpPr>
+        <p:spPr/>
+        <p:txBody>
+          <a:bodyPr/>
+          <a:lstStyle/>
+          <a:p>
+            <a:r>
+              <a:rPr lang="de-DE" altLang="en-US" dirty="0" smtClean="0"/>
+              <a:t>Leonard Kleinberger – lkleinbe@rhrk.uni-kl.de</a:t>
+            </a:r>
+            <a:endParaRPr lang="de-DE" altLang="en-US" dirty="0"/>
+          </a:p>
+        </p:txBody>
+      </p:sp>
+      <p:sp>
+        <p:nvSpPr>
+          <p:cNvPr id="5" name="Foliennummernplatzhalter 4"/>
+          <p:cNvSpPr>
+            <a:spLocks noGrp="1"/>
+          </p:cNvSpPr>
+          <p:nvPr>
+            <p:ph type="sldNum" sz="quarter" idx="11"/>
+          </p:nvPr>
+        </p:nvSpPr>
+        <p:spPr/>
+        <p:txBody>
+          <a:bodyPr/>
+          <a:lstStyle/>
+          <a:p>
+            <a:fld id="{C5DE44B6-7407-4F78-9D00-6A453AC7563D}" type="slidenum">
+              <a:rPr lang="de-DE" altLang="en-US" smtClean="0"/>
+              <a:pPr/>
+              <a:t>2</a:t>
+            </a:fld>
+            <a:r>
+              <a:rPr lang="de-DE" altLang="en-US" smtClean="0"/>
+              <a:t>/XX</a:t>
+            </a:r>
+            <a:endParaRPr lang="de-DE" altLang="en-US"/>
           </a:p>
         </p:txBody>
       </p:sp>
     </p:spTree>
+    <p:extLst>
+      <p:ext uri="{BB962C8B-B14F-4D97-AF65-F5344CB8AC3E}">
+        <p14:creationId xmlns:p14="http://schemas.microsoft.com/office/powerpoint/2010/main" val="2765811182"/>
+      </p:ext>
+    </p:extLst>
   </p:cSld>
   <p:clrMapOvr>
     <a:masterClrMapping/>
   </p:clrMapOvr>
   <p:transition/>
-  <p:timing>
-    <p:tnLst>
-      <p:par>
-        <p:cTn id="1" dur="indefinite" restart="never" nodeType="tmRoot"/>
-      </p:par>
-    </p:tnLst>
-  </p:timing>
 </p:sld>
 </file>
 
@@ -8323,12 +8407,8 @@
           <a:lstStyle/>
           <a:p>
             <a:r>
-              <a:rPr lang="de-DE" altLang="en-US" noProof="1"/>
-              <a:t>LTE </a:t>
-            </a:r>
-            <a:r>
               <a:rPr lang="de-DE" altLang="en-US" noProof="1" smtClean="0"/>
-              <a:t>Networks</a:t>
+              <a:t>LTE Networks</a:t>
             </a:r>
             <a:endParaRPr lang="de-DE" dirty="0"/>
           </a:p>
@@ -8350,10 +8430,9 @@
           <a:lstStyle/>
           <a:p>
             <a:r>
-              <a:rPr lang="de-DE" altLang="en-US" smtClean="0"/>
-              <a:t>Speaker – Title (set in slide master, not footer settings)</a:t>
-            </a:r>
-            <a:endParaRPr lang="de-DE" altLang="en-US"/>
+              <a:rPr lang="de-DE" altLang="en-US" dirty="0"/>
+              <a:t>Leonard Kleinberger – lkleinbe@rhrk.uni-kl.de</a:t>
+            </a:r>
           </a:p>
         </p:txBody>
       </p:sp>
@@ -8497,10 +8576,9 @@
           <a:lstStyle/>
           <a:p>
             <a:r>
-              <a:rPr lang="de-DE" altLang="en-US" smtClean="0"/>
-              <a:t>Speaker – Title (set in slide master, not footer settings)</a:t>
-            </a:r>
-            <a:endParaRPr lang="de-DE" altLang="en-US"/>
+              <a:rPr lang="de-DE" altLang="en-US" dirty="0"/>
+              <a:t>Leonard Kleinberger – lkleinbe@rhrk.uni-kl.de</a:t>
+            </a:r>
           </a:p>
         </p:txBody>
       </p:sp>
@@ -9000,10 +9078,9 @@
           <a:lstStyle/>
           <a:p>
             <a:r>
-              <a:rPr lang="de-DE" altLang="en-US" smtClean="0"/>
-              <a:t>Speaker – Title (set in slide master, not footer settings)</a:t>
-            </a:r>
-            <a:endParaRPr lang="de-DE" altLang="en-US"/>
+              <a:rPr lang="de-DE" altLang="en-US" dirty="0"/>
+              <a:t>Leonard Kleinberger – lkleinbe@rhrk.uni-kl.de</a:t>
+            </a:r>
           </a:p>
         </p:txBody>
       </p:sp>
@@ -9569,10 +9646,9 @@
           <a:lstStyle/>
           <a:p>
             <a:r>
-              <a:rPr lang="de-DE" altLang="en-US" smtClean="0"/>
-              <a:t>Speaker – Title (set in slide master, not footer settings)</a:t>
-            </a:r>
-            <a:endParaRPr lang="de-DE" altLang="en-US"/>
+              <a:rPr lang="de-DE" altLang="en-US" dirty="0"/>
+              <a:t>Leonard Kleinberger – lkleinbe@rhrk.uni-kl.de</a:t>
+            </a:r>
           </a:p>
         </p:txBody>
       </p:sp>
@@ -9685,10 +9761,9 @@
           <a:lstStyle/>
           <a:p>
             <a:r>
-              <a:rPr lang="de-DE" altLang="en-US" smtClean="0"/>
-              <a:t>Speaker – Title (set in slide master, not footer settings)</a:t>
-            </a:r>
-            <a:endParaRPr lang="de-DE" altLang="en-US"/>
+              <a:rPr lang="de-DE" altLang="en-US" dirty="0"/>
+              <a:t>Leonard Kleinberger – lkleinbe@rhrk.uni-kl.de</a:t>
+            </a:r>
           </a:p>
         </p:txBody>
       </p:sp>
@@ -9891,10 +9966,9 @@
           <a:lstStyle/>
           <a:p>
             <a:r>
-              <a:rPr lang="de-DE" altLang="en-US" smtClean="0"/>
-              <a:t>Speaker – Title (set in slide master, not footer settings)</a:t>
-            </a:r>
-            <a:endParaRPr lang="de-DE" altLang="en-US"/>
+              <a:rPr lang="de-DE" altLang="en-US" dirty="0"/>
+              <a:t>Leonard Kleinberger – lkleinbe@rhrk.uni-kl.de</a:t>
+            </a:r>
           </a:p>
         </p:txBody>
       </p:sp>
@@ -9953,13 +10027,8 @@
           <a:p>
             <a:r>
               <a:rPr lang="en-US" noProof="1" smtClean="0"/>
-              <a:t>UE</a:t>
-            </a:r>
-            <a:r>
-              <a:rPr lang="en-US" noProof="1" smtClean="0"/>
-              <a:t>:</a:t>
-            </a:r>
-            <a:endParaRPr lang="en-US" noProof="1" smtClean="0"/>
+              <a:t>UE:</a:t>
+            </a:r>
           </a:p>
           <a:p>
             <a:pPr marL="285750" indent="-285750">
@@ -9968,19 +10037,7 @@
             </a:pPr>
             <a:r>
               <a:rPr lang="en-US" noProof="1" smtClean="0"/>
-              <a:t>Send </a:t>
-            </a:r>
-            <a:r>
-              <a:rPr lang="en-US" noProof="1" smtClean="0"/>
-              <a:t>one of </a:t>
-            </a:r>
-            <a:r>
-              <a:rPr lang="en-US" noProof="1" smtClean="0"/>
-              <a:t>M </a:t>
-            </a:r>
-            <a:r>
-              <a:rPr lang="en-US" noProof="1" smtClean="0"/>
-              <a:t>Preambles on PRACH</a:t>
+              <a:t>Send one of M Preambles on PRACH</a:t>
             </a:r>
           </a:p>
           <a:p>
@@ -10009,7 +10066,6 @@
               <a:rPr lang="en-US" noProof="1" smtClean="0"/>
               <a:t>eNodeB:</a:t>
             </a:r>
-            <a:endParaRPr lang="en-US" noProof="1" smtClean="0"/>
           </a:p>
           <a:p>
             <a:pPr marL="285750" indent="-285750">
@@ -10018,15 +10074,7 @@
             </a:pPr>
             <a:r>
               <a:rPr lang="en-US" noProof="1" smtClean="0"/>
-              <a:t>Reply containing </a:t>
-            </a:r>
-            <a:r>
-              <a:rPr lang="en-US" noProof="1" smtClean="0"/>
-              <a:t>UL </a:t>
-            </a:r>
-            <a:r>
-              <a:rPr lang="en-US" noProof="1" smtClean="0"/>
-              <a:t>Grant on PRACH</a:t>
+              <a:t>Reply containing UL Grant on PRACH</a:t>
             </a:r>
             <a:endParaRPr lang="en-US" noProof="1"/>
           </a:p>
@@ -10137,10 +10185,9 @@
           <a:lstStyle/>
           <a:p>
             <a:r>
-              <a:rPr lang="de-DE" altLang="en-US" smtClean="0"/>
-              <a:t>Speaker – Title (set in slide master, not footer settings)</a:t>
-            </a:r>
-            <a:endParaRPr lang="de-DE" altLang="en-US"/>
+              <a:rPr lang="de-DE" altLang="en-US" dirty="0"/>
+              <a:t>Leonard Kleinberger – lkleinbe@rhrk.uni-kl.de</a:t>
+            </a:r>
           </a:p>
         </p:txBody>
       </p:sp>

</xml_diff>